<commit_message>
Avalonia project updated, basics view model created
</commit_message>
<xml_diff>
--- a/docs/design_decisions/Prototipo de UI.pptx
+++ b/docs/design_decisions/Prototipo de UI.pptx
@@ -10688,8 +10688,8 @@
         </p:blipFill>
         <p:spPr>
           <a:xfrm>
-            <a:off x="110490" y="139065"/>
-            <a:ext cx="1591945" cy="1591945"/>
+            <a:off x="10898505" y="1947545"/>
+            <a:ext cx="939800" cy="939800"/>
           </a:xfrm>
           <a:prstGeom prst="rect">
             <a:avLst/>
@@ -10712,7 +10712,7 @@
         </p:blipFill>
         <p:spPr>
           <a:xfrm>
-            <a:off x="231140" y="597535"/>
+            <a:off x="1654175" y="741045"/>
             <a:ext cx="1223645" cy="1223645"/>
           </a:xfrm>
           <a:prstGeom prst="rect">
@@ -10802,7 +10802,7 @@
         </p:blipFill>
         <p:spPr>
           <a:xfrm>
-            <a:off x="5704840" y="2485390"/>
+            <a:off x="7626350" y="3989070"/>
             <a:ext cx="304800" cy="304800"/>
           </a:xfrm>
           <a:prstGeom prst="rect">
@@ -10812,7 +10812,7 @@
       </p:pic>
       <p:pic>
         <p:nvPicPr>
-          <p:cNvPr id="33" name="Picture 32" descr="check-bold"/>
+          <p:cNvPr id="34" name="Picture 33" descr="download-simple-bold"/>
           <p:cNvPicPr>
             <a:picLocks noChangeAspect="1"/>
           </p:cNvPicPr>
@@ -10826,32 +10826,8 @@
         </p:blipFill>
         <p:spPr>
           <a:xfrm>
-            <a:off x="511175" y="604520"/>
-            <a:ext cx="1143000" cy="1143000"/>
-          </a:xfrm>
-          <a:prstGeom prst="rect">
-            <a:avLst/>
-          </a:prstGeom>
-        </p:spPr>
-      </p:pic>
-      <p:pic>
-        <p:nvPicPr>
-          <p:cNvPr id="34" name="Picture 33" descr="download-simple-bold"/>
-          <p:cNvPicPr>
-            <a:picLocks noChangeAspect="1"/>
-          </p:cNvPicPr>
-          <p:nvPr/>
-        </p:nvPicPr>
-        <p:blipFill>
-          <a:blip r:embed="rId11"/>
-          <a:stretch>
-            <a:fillRect/>
-          </a:stretch>
-        </p:blipFill>
-        <p:spPr>
-          <a:xfrm>
-            <a:off x="0" y="383540"/>
-            <a:ext cx="1651635" cy="1651635"/>
+            <a:off x="10898505" y="180340"/>
+            <a:ext cx="807720" cy="807720"/>
           </a:xfrm>
           <a:prstGeom prst="rect">
             <a:avLst/>
@@ -10867,10 +10843,10 @@
           <p:nvPr/>
         </p:nvPicPr>
         <p:blipFill>
-          <a:blip r:embed="rId12">
+          <a:blip r:embed="rId11">
             <a:extLst>
               <a:ext uri="{96DAC541-7B7A-43D3-8B79-37D633B846F1}">
-                <asvg:svgBlip xmlns:asvg="http://schemas.microsoft.com/office/drawing/2016/SVG/main" r:embed="rId13"/>
+                <asvg:svgBlip xmlns:asvg="http://schemas.microsoft.com/office/drawing/2016/SVG/main" r:embed="rId12"/>
               </a:ext>
             </a:extLst>
           </a:blip>
@@ -10897,14 +10873,14 @@
           <p:nvPr/>
         </p:nvPicPr>
         <p:blipFill>
-          <a:blip r:embed="rId14"/>
+          <a:blip r:embed="rId13"/>
           <a:stretch>
             <a:fillRect/>
           </a:stretch>
         </p:blipFill>
         <p:spPr>
           <a:xfrm>
-            <a:off x="-102870" y="147320"/>
+            <a:off x="4584065" y="395605"/>
             <a:ext cx="2123440" cy="2123440"/>
           </a:xfrm>
           <a:prstGeom prst="rect">
@@ -10921,10 +10897,10 @@
           <p:nvPr/>
         </p:nvPicPr>
         <p:blipFill>
-          <a:blip r:embed="rId15">
+          <a:blip r:embed="rId14">
             <a:extLst>
               <a:ext uri="{96DAC541-7B7A-43D3-8B79-37D633B846F1}">
-                <asvg:svgBlip xmlns:asvg="http://schemas.microsoft.com/office/drawing/2016/SVG/main" r:embed="rId16"/>
+                <asvg:svgBlip xmlns:asvg="http://schemas.microsoft.com/office/drawing/2016/SVG/main" r:embed="rId15"/>
               </a:ext>
             </a:extLst>
           </a:blip>
@@ -10934,7 +10910,7 @@
         </p:blipFill>
         <p:spPr>
           <a:xfrm>
-            <a:off x="231140" y="325120"/>
+            <a:off x="4047490" y="477520"/>
             <a:ext cx="1702435" cy="1702435"/>
           </a:xfrm>
           <a:prstGeom prst="rect">
@@ -10951,10 +10927,10 @@
           <p:nvPr/>
         </p:nvPicPr>
         <p:blipFill>
-          <a:blip r:embed="rId17">
+          <a:blip r:embed="rId16">
             <a:extLst>
               <a:ext uri="{96DAC541-7B7A-43D3-8B79-37D633B846F1}">
-                <asvg:svgBlip xmlns:asvg="http://schemas.microsoft.com/office/drawing/2016/SVG/main" r:embed="rId18"/>
+                <asvg:svgBlip xmlns:asvg="http://schemas.microsoft.com/office/drawing/2016/SVG/main" r:embed="rId17"/>
               </a:ext>
             </a:extLst>
           </a:blip>
@@ -10964,7 +10940,7 @@
         </p:blipFill>
         <p:spPr>
           <a:xfrm>
-            <a:off x="-20320" y="325120"/>
+            <a:off x="3969385" y="106045"/>
             <a:ext cx="1858645" cy="1858645"/>
           </a:xfrm>
           <a:prstGeom prst="rect">
@@ -10981,15 +10957,15 @@
           <p:nvPr/>
         </p:nvPicPr>
         <p:blipFill>
-          <a:blip r:embed="rId19"/>
+          <a:blip r:embed="rId18"/>
           <a:stretch>
             <a:fillRect/>
           </a:stretch>
         </p:blipFill>
         <p:spPr>
           <a:xfrm>
-            <a:off x="-102870" y="147320"/>
-            <a:ext cx="2054860" cy="2054860"/>
+            <a:off x="10774680" y="2961640"/>
+            <a:ext cx="1417320" cy="1417320"/>
           </a:xfrm>
           <a:prstGeom prst="rect">
             <a:avLst/>
@@ -11005,15 +10981,15 @@
           <p:nvPr/>
         </p:nvPicPr>
         <p:blipFill>
-          <a:blip r:embed="rId20"/>
+          <a:blip r:embed="rId19"/>
           <a:stretch>
             <a:fillRect/>
           </a:stretch>
         </p:blipFill>
         <p:spPr>
           <a:xfrm>
-            <a:off x="255270" y="518795"/>
-            <a:ext cx="1302385" cy="1302385"/>
+            <a:off x="10898505" y="1111250"/>
+            <a:ext cx="853440" cy="853440"/>
           </a:xfrm>
           <a:prstGeom prst="rect">
             <a:avLst/>
@@ -11029,6 +11005,30 @@
           <p:nvPr/>
         </p:nvPicPr>
         <p:blipFill>
+          <a:blip r:embed="rId20"/>
+          <a:stretch>
+            <a:fillRect/>
+          </a:stretch>
+        </p:blipFill>
+        <p:spPr>
+          <a:xfrm>
+            <a:off x="4491990" y="1702435"/>
+            <a:ext cx="1084580" cy="1084580"/>
+          </a:xfrm>
+          <a:prstGeom prst="rect">
+            <a:avLst/>
+          </a:prstGeom>
+        </p:spPr>
+      </p:pic>
+      <p:pic>
+        <p:nvPicPr>
+          <p:cNvPr id="7" name="Picture 6" descr="check-bold"/>
+          <p:cNvPicPr>
+            <a:picLocks noChangeAspect="1"/>
+          </p:cNvPicPr>
+          <p:nvPr/>
+        </p:nvPicPr>
+        <p:blipFill>
           <a:blip r:embed="rId21"/>
           <a:stretch>
             <a:fillRect/>
@@ -11036,8 +11036,38 @@
         </p:blipFill>
         <p:spPr>
           <a:xfrm>
-            <a:off x="753745" y="667385"/>
-            <a:ext cx="1084580" cy="1084580"/>
+            <a:off x="6861810" y="3875405"/>
+            <a:ext cx="216535" cy="216535"/>
+          </a:xfrm>
+          <a:prstGeom prst="rect">
+            <a:avLst/>
+          </a:prstGeom>
+        </p:spPr>
+      </p:pic>
+      <p:pic>
+        <p:nvPicPr>
+          <p:cNvPr id="17" name="Picture 16" descr="check-bold"/>
+          <p:cNvPicPr>
+            <a:picLocks noChangeAspect="1"/>
+          </p:cNvPicPr>
+          <p:nvPr/>
+        </p:nvPicPr>
+        <p:blipFill>
+          <a:blip r:embed="rId22">
+            <a:extLst>
+              <a:ext uri="{96DAC541-7B7A-43D3-8B79-37D633B846F1}">
+                <asvg:svgBlip xmlns:asvg="http://schemas.microsoft.com/office/drawing/2016/SVG/main" r:embed="rId23"/>
+              </a:ext>
+            </a:extLst>
+          </a:blip>
+          <a:stretch>
+            <a:fillRect/>
+          </a:stretch>
+        </p:blipFill>
+        <p:spPr>
+          <a:xfrm>
+            <a:off x="3416935" y="3559175"/>
+            <a:ext cx="1365885" cy="1365885"/>
           </a:xfrm>
           <a:prstGeom prst="rect">
             <a:avLst/>
@@ -11967,7 +11997,7 @@
         <p:spPr>
           <a:xfrm>
             <a:off x="8691880" y="2310765"/>
-            <a:ext cx="2468880" cy="548640"/>
+            <a:ext cx="2468880" cy="636270"/>
           </a:xfrm>
           <a:prstGeom prst="roundRect">
             <a:avLst/>
@@ -12262,7 +12292,7 @@
         <p:spPr>
           <a:xfrm>
             <a:off x="8691880" y="4241165"/>
-            <a:ext cx="2468880" cy="548640"/>
+            <a:ext cx="2468880" cy="675640"/>
           </a:xfrm>
           <a:prstGeom prst="roundRect">
             <a:avLst/>
@@ -13589,6 +13619,66 @@
           <a:xfrm>
             <a:off x="255270" y="252730"/>
             <a:ext cx="426720" cy="426720"/>
+          </a:xfrm>
+          <a:prstGeom prst="rect">
+            <a:avLst/>
+          </a:prstGeom>
+        </p:spPr>
+      </p:pic>
+      <p:pic>
+        <p:nvPicPr>
+          <p:cNvPr id="17" name="Picture 16" descr="check-bold"/>
+          <p:cNvPicPr>
+            <a:picLocks noChangeAspect="1"/>
+          </p:cNvPicPr>
+          <p:nvPr/>
+        </p:nvPicPr>
+        <p:blipFill>
+          <a:blip r:embed="rId12">
+            <a:extLst>
+              <a:ext uri="{96DAC541-7B7A-43D3-8B79-37D633B846F1}">
+                <asvg:svgBlip xmlns:asvg="http://schemas.microsoft.com/office/drawing/2016/SVG/main" r:embed="rId13"/>
+              </a:ext>
+            </a:extLst>
+          </a:blip>
+          <a:stretch>
+            <a:fillRect/>
+          </a:stretch>
+        </p:blipFill>
+        <p:spPr>
+          <a:xfrm>
+            <a:off x="10878185" y="2701290"/>
+            <a:ext cx="217170" cy="217170"/>
+          </a:xfrm>
+          <a:prstGeom prst="rect">
+            <a:avLst/>
+          </a:prstGeom>
+        </p:spPr>
+      </p:pic>
+      <p:pic>
+        <p:nvPicPr>
+          <p:cNvPr id="16" name="Picture 15" descr="check-bold"/>
+          <p:cNvPicPr>
+            <a:picLocks noChangeAspect="1"/>
+          </p:cNvPicPr>
+          <p:nvPr/>
+        </p:nvPicPr>
+        <p:blipFill>
+          <a:blip r:embed="rId14">
+            <a:extLst>
+              <a:ext uri="{96DAC541-7B7A-43D3-8B79-37D633B846F1}">
+                <asvg:svgBlip xmlns:asvg="http://schemas.microsoft.com/office/drawing/2016/SVG/main" r:embed="rId15"/>
+              </a:ext>
+            </a:extLst>
+          </a:blip>
+          <a:stretch>
+            <a:fillRect/>
+          </a:stretch>
+        </p:blipFill>
+        <p:spPr>
+          <a:xfrm>
+            <a:off x="10878185" y="4699635"/>
+            <a:ext cx="217170" cy="217170"/>
           </a:xfrm>
           <a:prstGeom prst="rect">
             <a:avLst/>
@@ -19275,8 +19365,8 @@
         </p:nvSpPr>
         <p:spPr>
           <a:xfrm>
-            <a:off x="8691880" y="4241165"/>
-            <a:ext cx="2468880" cy="548640"/>
+            <a:off x="8691880" y="4112260"/>
+            <a:ext cx="2468880" cy="803910"/>
           </a:xfrm>
           <a:prstGeom prst="roundRect">
             <a:avLst/>
@@ -19317,16 +19407,6 @@
           <a:bodyPr rtlCol="0" anchor="ctr"/>
           <a:p>
             <a:pPr algn="ctr"/>
-            <a:r>
-              <a:rPr lang="en-US" sz="1400">
-                <a:solidFill>
-                  <a:srgbClr val="2D274B"/>
-                </a:solidFill>
-                <a:latin typeface="Noto Sans" panose="020B0502040504020204" charset="0"/>
-                <a:cs typeface="Noto Sans" panose="020B0502040504020204" charset="0"/>
-              </a:rPr>
-              <a:t>Por supuesto! Ahí estare</a:t>
-            </a:r>
             <a:endParaRPr lang="en-US" sz="1400">
               <a:solidFill>
                 <a:srgbClr val="2D274B"/>
@@ -19370,8 +19450,8 @@
         </p:nvSpPr>
         <p:spPr>
           <a:xfrm>
-            <a:off x="5560060" y="4916805"/>
-            <a:ext cx="2468880" cy="548640"/>
+            <a:off x="5560060" y="4900930"/>
+            <a:ext cx="2468880" cy="676275"/>
           </a:xfrm>
           <a:prstGeom prst="roundRect">
             <a:avLst/>
@@ -19412,13 +19492,6 @@
           <a:bodyPr rtlCol="0" anchor="ctr"/>
           <a:p>
             <a:pPr algn="l"/>
-            <a:r>
-              <a:rPr lang="en-US" sz="1400">
-                <a:latin typeface="Noto Sans" panose="020B0502040504020204" charset="0"/>
-                <a:cs typeface="Noto Sans" panose="020B0502040504020204" charset="0"/>
-              </a:rPr>
-              <a:t>Ok, nos vemos!</a:t>
-            </a:r>
             <a:endParaRPr lang="en-US" sz="1400">
               <a:latin typeface="Noto Sans" panose="020B0502040504020204" charset="0"/>
               <a:cs typeface="Noto Sans" panose="020B0502040504020204" charset="0"/>
@@ -20259,7 +20332,7 @@
         </p:nvSpPr>
         <p:spPr>
           <a:xfrm>
-            <a:off x="5560060" y="5472430"/>
+            <a:off x="5560060" y="5591175"/>
             <a:ext cx="571500" cy="275590"/>
           </a:xfrm>
           <a:prstGeom prst="rect">
@@ -20603,6 +20676,391 @@
           <a:xfrm>
             <a:off x="255270" y="252730"/>
             <a:ext cx="426720" cy="426720"/>
+          </a:xfrm>
+          <a:prstGeom prst="rect">
+            <a:avLst/>
+          </a:prstGeom>
+        </p:spPr>
+      </p:pic>
+      <p:sp>
+        <p:nvSpPr>
+          <p:cNvPr id="48" name="Text Box 47"/>
+          <p:cNvSpPr txBox="1"/>
+          <p:nvPr/>
+        </p:nvSpPr>
+        <p:spPr>
+          <a:xfrm>
+            <a:off x="6009640" y="4970780"/>
+            <a:ext cx="1636395" cy="491490"/>
+          </a:xfrm>
+          <a:prstGeom prst="rect">
+            <a:avLst/>
+          </a:prstGeom>
+          <a:noFill/>
+        </p:spPr>
+        <p:txBody>
+          <a:bodyPr wrap="square" rtlCol="0">
+            <a:spAutoFit/>
+          </a:bodyPr>
+          <a:p>
+            <a:pPr>
+              <a:lnSpc>
+                <a:spcPct val="100000"/>
+              </a:lnSpc>
+            </a:pPr>
+            <a:r>
+              <a:rPr lang="en-US" sz="1400">
+                <a:solidFill>
+                  <a:schemeClr val="bg1"/>
+                </a:solidFill>
+                <a:latin typeface="Noto Sans" panose="020B0502040504020204" charset="0"/>
+                <a:cs typeface="Noto Sans" panose="020B0502040504020204" charset="0"/>
+              </a:rPr>
+              <a:t>Archivo1</a:t>
+            </a:r>
+            <a:endParaRPr lang="en-US" sz="1600">
+              <a:solidFill>
+                <a:schemeClr val="bg1"/>
+              </a:solidFill>
+              <a:latin typeface="Noto Sans" panose="020B0502040504020204" charset="0"/>
+              <a:cs typeface="Noto Sans" panose="020B0502040504020204" charset="0"/>
+            </a:endParaRPr>
+          </a:p>
+          <a:p>
+            <a:pPr>
+              <a:lnSpc>
+                <a:spcPct val="100000"/>
+              </a:lnSpc>
+            </a:pPr>
+            <a:r>
+              <a:rPr lang="en-US" sz="1000">
+                <a:solidFill>
+                  <a:schemeClr val="bg1"/>
+                </a:solidFill>
+                <a:latin typeface="Noto Sans" panose="020B0502040504020204" charset="0"/>
+                <a:cs typeface="Noto Sans" panose="020B0502040504020204" charset="0"/>
+              </a:rPr>
+              <a:t>64 MB</a:t>
+            </a:r>
+            <a:r>
+              <a:rPr lang="en-US" sz="1200">
+                <a:solidFill>
+                  <a:schemeClr val="bg1"/>
+                </a:solidFill>
+                <a:latin typeface="Noto Sans" panose="020B0502040504020204" charset="0"/>
+                <a:cs typeface="Noto Sans" panose="020B0502040504020204" charset="0"/>
+              </a:rPr>
+              <a:t>	</a:t>
+            </a:r>
+            <a:r>
+              <a:rPr lang="en-US" sz="1200">
+                <a:solidFill>
+                  <a:schemeClr val="bg1">
+                    <a:lumMod val="65000"/>
+                  </a:schemeClr>
+                </a:solidFill>
+                <a:latin typeface="Noto Sans" panose="020B0502040504020204" charset="0"/>
+                <a:cs typeface="Noto Sans" panose="020B0502040504020204" charset="0"/>
+              </a:rPr>
+              <a:t>                    </a:t>
+            </a:r>
+            <a:endParaRPr lang="en-US" sz="1200">
+              <a:solidFill>
+                <a:schemeClr val="bg1">
+                  <a:lumMod val="65000"/>
+                </a:schemeClr>
+              </a:solidFill>
+              <a:latin typeface="Noto Sans" panose="020B0502040504020204" charset="0"/>
+              <a:cs typeface="Noto Sans" panose="020B0502040504020204" charset="0"/>
+            </a:endParaRPr>
+          </a:p>
+        </p:txBody>
+      </p:sp>
+      <p:pic>
+        <p:nvPicPr>
+          <p:cNvPr id="42" name="Picture 41" descr="file-arrow-down-bold"/>
+          <p:cNvPicPr>
+            <a:picLocks noChangeAspect="1"/>
+          </p:cNvPicPr>
+          <p:nvPr/>
+        </p:nvPicPr>
+        <p:blipFill>
+          <a:blip r:embed="rId12">
+            <a:extLst>
+              <a:ext uri="{96DAC541-7B7A-43D3-8B79-37D633B846F1}">
+                <asvg:svgBlip xmlns:asvg="http://schemas.microsoft.com/office/drawing/2016/SVG/main" r:embed="rId13"/>
+              </a:ext>
+            </a:extLst>
+          </a:blip>
+          <a:stretch>
+            <a:fillRect/>
+          </a:stretch>
+        </p:blipFill>
+        <p:spPr>
+          <a:xfrm>
+            <a:off x="5654040" y="5051425"/>
+            <a:ext cx="384175" cy="384175"/>
+          </a:xfrm>
+          <a:prstGeom prst="rect">
+            <a:avLst/>
+          </a:prstGeom>
+        </p:spPr>
+      </p:pic>
+      <p:sp>
+        <p:nvSpPr>
+          <p:cNvPr id="72" name="Text Box 71"/>
+          <p:cNvSpPr txBox="1"/>
+          <p:nvPr/>
+        </p:nvSpPr>
+        <p:spPr>
+          <a:xfrm>
+            <a:off x="9100820" y="4200525"/>
+            <a:ext cx="1783715" cy="491490"/>
+          </a:xfrm>
+          <a:prstGeom prst="rect">
+            <a:avLst/>
+          </a:prstGeom>
+          <a:noFill/>
+        </p:spPr>
+        <p:txBody>
+          <a:bodyPr wrap="square" rtlCol="0">
+            <a:spAutoFit/>
+          </a:bodyPr>
+          <a:p>
+            <a:pPr>
+              <a:lnSpc>
+                <a:spcPct val="100000"/>
+              </a:lnSpc>
+            </a:pPr>
+            <a:r>
+              <a:rPr lang="en-US" sz="1400">
+                <a:solidFill>
+                  <a:srgbClr val="2D274B"/>
+                </a:solidFill>
+                <a:latin typeface="Noto Sans" panose="020B0502040504020204" charset="0"/>
+                <a:cs typeface="Noto Sans" panose="020B0502040504020204" charset="0"/>
+              </a:rPr>
+              <a:t>Archivo2</a:t>
+            </a:r>
+            <a:endParaRPr lang="en-US" sz="1400">
+              <a:solidFill>
+                <a:srgbClr val="2D274B"/>
+              </a:solidFill>
+              <a:latin typeface="Noto Sans" panose="020B0502040504020204" charset="0"/>
+              <a:cs typeface="Noto Sans" panose="020B0502040504020204" charset="0"/>
+            </a:endParaRPr>
+          </a:p>
+          <a:p>
+            <a:pPr>
+              <a:lnSpc>
+                <a:spcPct val="100000"/>
+              </a:lnSpc>
+            </a:pPr>
+            <a:r>
+              <a:rPr lang="en-US" sz="1000">
+                <a:solidFill>
+                  <a:srgbClr val="2D274B"/>
+                </a:solidFill>
+                <a:latin typeface="Noto Sans" panose="020B0502040504020204" charset="0"/>
+                <a:cs typeface="Noto Sans" panose="020B0502040504020204" charset="0"/>
+              </a:rPr>
+              <a:t>10.5 MB</a:t>
+            </a:r>
+            <a:r>
+              <a:rPr lang="en-US" sz="1200">
+                <a:solidFill>
+                  <a:schemeClr val="bg1">
+                    <a:lumMod val="65000"/>
+                  </a:schemeClr>
+                </a:solidFill>
+                <a:latin typeface="Noto Sans" panose="020B0502040504020204" charset="0"/>
+                <a:cs typeface="Noto Sans" panose="020B0502040504020204" charset="0"/>
+              </a:rPr>
+              <a:t>	                    </a:t>
+            </a:r>
+            <a:endParaRPr lang="en-US" sz="1200">
+              <a:solidFill>
+                <a:schemeClr val="bg1">
+                  <a:lumMod val="65000"/>
+                </a:schemeClr>
+              </a:solidFill>
+              <a:latin typeface="Noto Sans" panose="020B0502040504020204" charset="0"/>
+              <a:cs typeface="Noto Sans" panose="020B0502040504020204" charset="0"/>
+            </a:endParaRPr>
+          </a:p>
+        </p:txBody>
+      </p:sp>
+      <p:sp>
+        <p:nvSpPr>
+          <p:cNvPr id="73" name="Rounded Rectangle 72"/>
+          <p:cNvSpPr/>
+          <p:nvPr/>
+        </p:nvSpPr>
+        <p:spPr>
+          <a:xfrm>
+            <a:off x="8840470" y="4692015"/>
+            <a:ext cx="2155190" cy="76200"/>
+          </a:xfrm>
+          <a:prstGeom prst="roundRect">
+            <a:avLst/>
+          </a:prstGeom>
+          <a:solidFill>
+            <a:schemeClr val="bg1">
+              <a:lumMod val="65000"/>
+            </a:schemeClr>
+          </a:solidFill>
+          <a:ln>
+            <a:solidFill>
+              <a:schemeClr val="bg1">
+                <a:lumMod val="65000"/>
+              </a:schemeClr>
+            </a:solidFill>
+          </a:ln>
+        </p:spPr>
+        <p:style>
+          <a:lnRef idx="2">
+            <a:schemeClr val="accent1">
+              <a:shade val="50000"/>
+            </a:schemeClr>
+          </a:lnRef>
+          <a:fillRef idx="1">
+            <a:schemeClr val="accent1"/>
+          </a:fillRef>
+          <a:effectRef idx="0">
+            <a:schemeClr val="accent1"/>
+          </a:effectRef>
+          <a:fontRef idx="minor">
+            <a:schemeClr val="lt1"/>
+          </a:fontRef>
+        </p:style>
+        <p:txBody>
+          <a:bodyPr rtlCol="0" anchor="ctr"/>
+          <a:p>
+            <a:pPr algn="ctr"/>
+            <a:endParaRPr lang="en-US"/>
+          </a:p>
+        </p:txBody>
+      </p:sp>
+      <p:sp>
+        <p:nvSpPr>
+          <p:cNvPr id="74" name="Rounded Rectangle 73"/>
+          <p:cNvSpPr/>
+          <p:nvPr/>
+        </p:nvSpPr>
+        <p:spPr>
+          <a:xfrm>
+            <a:off x="8828405" y="4692015"/>
+            <a:ext cx="1723390" cy="76200"/>
+          </a:xfrm>
+          <a:prstGeom prst="roundRect">
+            <a:avLst/>
+          </a:prstGeom>
+          <a:solidFill>
+            <a:srgbClr val="9787F4"/>
+          </a:solidFill>
+          <a:ln>
+            <a:solidFill>
+              <a:srgbClr val="9787F4"/>
+            </a:solidFill>
+          </a:ln>
+        </p:spPr>
+        <p:style>
+          <a:lnRef idx="2">
+            <a:schemeClr val="accent1">
+              <a:shade val="50000"/>
+            </a:schemeClr>
+          </a:lnRef>
+          <a:fillRef idx="1">
+            <a:schemeClr val="accent1"/>
+          </a:fillRef>
+          <a:effectRef idx="0">
+            <a:schemeClr val="accent1"/>
+          </a:effectRef>
+          <a:fontRef idx="minor">
+            <a:schemeClr val="lt1"/>
+          </a:fontRef>
+        </p:style>
+        <p:txBody>
+          <a:bodyPr rtlCol="0" anchor="ctr"/>
+          <a:p>
+            <a:pPr algn="ctr"/>
+            <a:endParaRPr lang="en-US"/>
+          </a:p>
+        </p:txBody>
+      </p:sp>
+      <p:sp>
+        <p:nvSpPr>
+          <p:cNvPr id="75" name="Text Box 74"/>
+          <p:cNvSpPr txBox="1"/>
+          <p:nvPr/>
+        </p:nvSpPr>
+        <p:spPr>
+          <a:xfrm>
+            <a:off x="10512425" y="4343400"/>
+            <a:ext cx="483235" cy="275590"/>
+          </a:xfrm>
+          <a:prstGeom prst="rect">
+            <a:avLst/>
+          </a:prstGeom>
+          <a:noFill/>
+          <a:ln>
+            <a:noFill/>
+          </a:ln>
+        </p:spPr>
+        <p:txBody>
+          <a:bodyPr wrap="none" rtlCol="0">
+            <a:spAutoFit/>
+          </a:bodyPr>
+          <a:p>
+            <a:pPr algn="r"/>
+            <a:r>
+              <a:rPr lang="en-US" sz="1200">
+                <a:solidFill>
+                  <a:schemeClr val="bg1">
+                    <a:lumMod val="65000"/>
+                  </a:schemeClr>
+                </a:solidFill>
+                <a:latin typeface="Noto Sans" panose="020B0502040504020204" charset="0"/>
+                <a:cs typeface="Noto Sans" panose="020B0502040504020204" charset="0"/>
+              </a:rPr>
+              <a:t>87%</a:t>
+            </a:r>
+            <a:endParaRPr lang="en-US" sz="1200">
+              <a:solidFill>
+                <a:schemeClr val="bg1">
+                  <a:lumMod val="65000"/>
+                </a:schemeClr>
+              </a:solidFill>
+              <a:latin typeface="Noto Sans" panose="020B0502040504020204" charset="0"/>
+              <a:cs typeface="Noto Sans" panose="020B0502040504020204" charset="0"/>
+            </a:endParaRPr>
+          </a:p>
+        </p:txBody>
+      </p:sp>
+      <p:pic>
+        <p:nvPicPr>
+          <p:cNvPr id="5" name="Picture 4" descr="file-arrow-down-bold"/>
+          <p:cNvPicPr>
+            <a:picLocks noChangeAspect="1"/>
+          </p:cNvPicPr>
+          <p:nvPr/>
+        </p:nvPicPr>
+        <p:blipFill>
+          <a:blip r:embed="rId14">
+            <a:extLst>
+              <a:ext uri="{96DAC541-7B7A-43D3-8B79-37D633B846F1}">
+                <asvg:svgBlip xmlns:asvg="http://schemas.microsoft.com/office/drawing/2016/SVG/main" r:embed="rId15"/>
+              </a:ext>
+            </a:extLst>
+          </a:blip>
+          <a:stretch>
+            <a:fillRect/>
+          </a:stretch>
+        </p:blipFill>
+        <p:spPr>
+          <a:xfrm>
+            <a:off x="8777605" y="4219575"/>
+            <a:ext cx="384175" cy="384175"/>
           </a:xfrm>
           <a:prstGeom prst="rect">
             <a:avLst/>

</xml_diff>

<commit_message>
Avalonia user interface updated, bindings almost complete
</commit_message>
<xml_diff>
--- a/docs/design_decisions/Prototipo de UI.pptx
+++ b/docs/design_decisions/Prototipo de UI.pptx
@@ -11083,13 +11083,7 @@
           <p:nvPr/>
         </p:nvPicPr>
         <p:blipFill>
-          <a:blip r:embed="rId24">
-            <a:extLst>
-              <a:ext uri="{96DAC541-7B7A-43D3-8B79-37D633B846F1}">
-                <asvg:svgBlip xmlns:asvg="http://schemas.microsoft.com/office/drawing/2016/SVG/main" r:embed="rId25"/>
-              </a:ext>
-            </a:extLst>
-          </a:blip>
+          <a:blip r:embed="rId24"/>
           <a:stretch>
             <a:fillRect/>
           </a:stretch>
@@ -11107,6 +11101,30 @@
       <p:pic>
         <p:nvPicPr>
           <p:cNvPr id="3" name="Picture 2" descr="file-arrow-down-bold"/>
+          <p:cNvPicPr>
+            <a:picLocks noChangeAspect="1"/>
+          </p:cNvPicPr>
+          <p:nvPr/>
+        </p:nvPicPr>
+        <p:blipFill>
+          <a:blip r:embed="rId25"/>
+          <a:stretch>
+            <a:fillRect/>
+          </a:stretch>
+        </p:blipFill>
+        <p:spPr>
+          <a:xfrm>
+            <a:off x="8413750" y="1073150"/>
+            <a:ext cx="2486025" cy="2486025"/>
+          </a:xfrm>
+          <a:prstGeom prst="rect">
+            <a:avLst/>
+          </a:prstGeom>
+        </p:spPr>
+      </p:pic>
+      <p:pic>
+        <p:nvPicPr>
+          <p:cNvPr id="4" name="Picture 3" descr="file-arrow-down"/>
           <p:cNvPicPr>
             <a:picLocks noChangeAspect="1"/>
           </p:cNvPicPr>
@@ -11126,8 +11144,8 @@
         </p:blipFill>
         <p:spPr>
           <a:xfrm>
-            <a:off x="6299200" y="2673350"/>
-            <a:ext cx="2486025" cy="2486025"/>
+            <a:off x="967740" y="3639820"/>
+            <a:ext cx="2480310" cy="2480310"/>
           </a:xfrm>
           <a:prstGeom prst="rect">
             <a:avLst/>
@@ -11136,7 +11154,7 @@
       </p:pic>
       <p:pic>
         <p:nvPicPr>
-          <p:cNvPr id="4" name="Picture 3" descr="file-arrow-down"/>
+          <p:cNvPr id="13" name="Picture 12" descr="users-four"/>
           <p:cNvPicPr>
             <a:picLocks noChangeAspect="1"/>
           </p:cNvPicPr>
@@ -11156,8 +11174,8 @@
         </p:blipFill>
         <p:spPr>
           <a:xfrm>
-            <a:off x="967740" y="3639820"/>
-            <a:ext cx="2480310" cy="2480310"/>
+            <a:off x="4774565" y="2961640"/>
+            <a:ext cx="2303780" cy="2303780"/>
           </a:xfrm>
           <a:prstGeom prst="rect">
             <a:avLst/>

</xml_diff>

<commit_message>
Sync for bug fixing
</commit_message>
<xml_diff>
--- a/docs/design_decisions/Prototipo de UI.pptx
+++ b/docs/design_decisions/Prototipo de UI.pptx
@@ -11053,10 +11053,82 @@
           <p:nvPr/>
         </p:nvPicPr>
         <p:blipFill>
-          <a:blip r:embed="rId22">
+          <a:blip r:embed="rId22"/>
+          <a:stretch>
+            <a:fillRect/>
+          </a:stretch>
+        </p:blipFill>
+        <p:spPr>
+          <a:xfrm>
+            <a:off x="3416935" y="3559175"/>
+            <a:ext cx="1365885" cy="1365885"/>
+          </a:xfrm>
+          <a:prstGeom prst="rect">
+            <a:avLst/>
+          </a:prstGeom>
+        </p:spPr>
+      </p:pic>
+      <p:pic>
+        <p:nvPicPr>
+          <p:cNvPr id="2" name="Picture 1" descr="file-arrow-down-bold"/>
+          <p:cNvPicPr>
+            <a:picLocks noChangeAspect="1"/>
+          </p:cNvPicPr>
+          <p:nvPr/>
+        </p:nvPicPr>
+        <p:blipFill>
+          <a:blip r:embed="rId23"/>
+          <a:stretch>
+            <a:fillRect/>
+          </a:stretch>
+        </p:blipFill>
+        <p:spPr>
+          <a:xfrm>
+            <a:off x="4150995" y="4293870"/>
+            <a:ext cx="1771650" cy="1771650"/>
+          </a:xfrm>
+          <a:prstGeom prst="rect">
+            <a:avLst/>
+          </a:prstGeom>
+        </p:spPr>
+      </p:pic>
+      <p:pic>
+        <p:nvPicPr>
+          <p:cNvPr id="3" name="Picture 2" descr="file-arrow-down-bold"/>
+          <p:cNvPicPr>
+            <a:picLocks noChangeAspect="1"/>
+          </p:cNvPicPr>
+          <p:nvPr/>
+        </p:nvPicPr>
+        <p:blipFill>
+          <a:blip r:embed="rId24"/>
+          <a:stretch>
+            <a:fillRect/>
+          </a:stretch>
+        </p:blipFill>
+        <p:spPr>
+          <a:xfrm>
+            <a:off x="8413750" y="1073150"/>
+            <a:ext cx="2486025" cy="2486025"/>
+          </a:xfrm>
+          <a:prstGeom prst="rect">
+            <a:avLst/>
+          </a:prstGeom>
+        </p:spPr>
+      </p:pic>
+      <p:pic>
+        <p:nvPicPr>
+          <p:cNvPr id="4" name="Picture 3" descr="file-arrow-down"/>
+          <p:cNvPicPr>
+            <a:picLocks noChangeAspect="1"/>
+          </p:cNvPicPr>
+          <p:nvPr/>
+        </p:nvPicPr>
+        <p:blipFill>
+          <a:blip r:embed="rId25">
             <a:extLst>
               <a:ext uri="{96DAC541-7B7A-43D3-8B79-37D633B846F1}">
-                <asvg:svgBlip xmlns:asvg="http://schemas.microsoft.com/office/drawing/2016/SVG/main" r:embed="rId23"/>
+                <asvg:svgBlip xmlns:asvg="http://schemas.microsoft.com/office/drawing/2016/SVG/main" r:embed="rId26"/>
               </a:ext>
             </a:extLst>
           </a:blip>
@@ -11066,8 +11138,8 @@
         </p:blipFill>
         <p:spPr>
           <a:xfrm>
-            <a:off x="3416935" y="3559175"/>
-            <a:ext cx="1365885" cy="1365885"/>
+            <a:off x="967740" y="3639820"/>
+            <a:ext cx="2480310" cy="2480310"/>
           </a:xfrm>
           <a:prstGeom prst="rect">
             <a:avLst/>
@@ -11076,65 +11148,17 @@
       </p:pic>
       <p:pic>
         <p:nvPicPr>
-          <p:cNvPr id="2" name="Picture 1" descr="file-arrow-down-bold"/>
+          <p:cNvPr id="13" name="Picture 12" descr="users-four"/>
           <p:cNvPicPr>
             <a:picLocks noChangeAspect="1"/>
           </p:cNvPicPr>
           <p:nvPr/>
         </p:nvPicPr>
         <p:blipFill>
-          <a:blip r:embed="rId24"/>
-          <a:stretch>
-            <a:fillRect/>
-          </a:stretch>
-        </p:blipFill>
-        <p:spPr>
-          <a:xfrm>
-            <a:off x="4150995" y="4293870"/>
-            <a:ext cx="1771650" cy="1771650"/>
-          </a:xfrm>
-          <a:prstGeom prst="rect">
-            <a:avLst/>
-          </a:prstGeom>
-        </p:spPr>
-      </p:pic>
-      <p:pic>
-        <p:nvPicPr>
-          <p:cNvPr id="3" name="Picture 2" descr="file-arrow-down-bold"/>
-          <p:cNvPicPr>
-            <a:picLocks noChangeAspect="1"/>
-          </p:cNvPicPr>
-          <p:nvPr/>
-        </p:nvPicPr>
-        <p:blipFill>
-          <a:blip r:embed="rId25"/>
-          <a:stretch>
-            <a:fillRect/>
-          </a:stretch>
-        </p:blipFill>
-        <p:spPr>
-          <a:xfrm>
-            <a:off x="8413750" y="1073150"/>
-            <a:ext cx="2486025" cy="2486025"/>
-          </a:xfrm>
-          <a:prstGeom prst="rect">
-            <a:avLst/>
-          </a:prstGeom>
-        </p:spPr>
-      </p:pic>
-      <p:pic>
-        <p:nvPicPr>
-          <p:cNvPr id="4" name="Picture 3" descr="file-arrow-down"/>
-          <p:cNvPicPr>
-            <a:picLocks noChangeAspect="1"/>
-          </p:cNvPicPr>
-          <p:nvPr/>
-        </p:nvPicPr>
-        <p:blipFill>
-          <a:blip r:embed="rId26">
+          <a:blip r:embed="rId27">
             <a:extLst>
               <a:ext uri="{96DAC541-7B7A-43D3-8B79-37D633B846F1}">
-                <asvg:svgBlip xmlns:asvg="http://schemas.microsoft.com/office/drawing/2016/SVG/main" r:embed="rId27"/>
+                <asvg:svgBlip xmlns:asvg="http://schemas.microsoft.com/office/drawing/2016/SVG/main" r:embed="rId28"/>
               </a:ext>
             </a:extLst>
           </a:blip>
@@ -11144,8 +11168,8 @@
         </p:blipFill>
         <p:spPr>
           <a:xfrm>
-            <a:off x="967740" y="3639820"/>
-            <a:ext cx="2480310" cy="2480310"/>
+            <a:off x="4774565" y="2961640"/>
+            <a:ext cx="2303780" cy="2303780"/>
           </a:xfrm>
           <a:prstGeom prst="rect">
             <a:avLst/>
@@ -11154,17 +11178,17 @@
       </p:pic>
       <p:pic>
         <p:nvPicPr>
-          <p:cNvPr id="13" name="Picture 12" descr="users-four"/>
+          <p:cNvPr id="16" name="Picture 15" descr="users-four-bold"/>
           <p:cNvPicPr>
             <a:picLocks noChangeAspect="1"/>
           </p:cNvPicPr>
           <p:nvPr/>
         </p:nvPicPr>
         <p:blipFill>
-          <a:blip r:embed="rId28">
+          <a:blip r:embed="rId29">
             <a:extLst>
               <a:ext uri="{96DAC541-7B7A-43D3-8B79-37D633B846F1}">
-                <asvg:svgBlip xmlns:asvg="http://schemas.microsoft.com/office/drawing/2016/SVG/main" r:embed="rId29"/>
+                <asvg:svgBlip xmlns:asvg="http://schemas.microsoft.com/office/drawing/2016/SVG/main" r:embed="rId30"/>
               </a:ext>
             </a:extLst>
           </a:blip>
@@ -11174,8 +11198,8 @@
         </p:blipFill>
         <p:spPr>
           <a:xfrm>
-            <a:off x="4774565" y="2961640"/>
-            <a:ext cx="2303780" cy="2303780"/>
+            <a:off x="6928485" y="3521075"/>
+            <a:ext cx="2428875" cy="2428875"/>
           </a:xfrm>
           <a:prstGeom prst="rect">
             <a:avLst/>

</xml_diff>

<commit_message>
Avalonia project updated, Shadow for text box implemented
</commit_message>
<xml_diff>
--- a/docs/design_decisions/Prototipo de UI.pptx
+++ b/docs/design_decisions/Prototipo de UI.pptx
@@ -13817,6 +13817,45 @@
           </a:prstGeom>
         </p:spPr>
       </p:pic>
+      <p:sp>
+        <p:nvSpPr>
+          <p:cNvPr id="2" name="Rounded Rectangle 1"/>
+          <p:cNvSpPr/>
+          <p:nvPr/>
+        </p:nvSpPr>
+        <p:spPr>
+          <a:xfrm>
+            <a:off x="8648700" y="430530"/>
+            <a:ext cx="1305560" cy="621665"/>
+          </a:xfrm>
+          <a:prstGeom prst="roundRect">
+            <a:avLst/>
+          </a:prstGeom>
+        </p:spPr>
+        <p:style>
+          <a:lnRef idx="2">
+            <a:schemeClr val="accent1">
+              <a:shade val="50000"/>
+            </a:schemeClr>
+          </a:lnRef>
+          <a:fillRef idx="1">
+            <a:schemeClr val="accent1"/>
+          </a:fillRef>
+          <a:effectRef idx="0">
+            <a:schemeClr val="accent1"/>
+          </a:effectRef>
+          <a:fontRef idx="minor">
+            <a:schemeClr val="lt1"/>
+          </a:fontRef>
+        </p:style>
+        <p:txBody>
+          <a:bodyPr rtlCol="0" anchor="ctr"/>
+          <a:p>
+            <a:pPr algn="ctr"/>
+            <a:endParaRPr lang="en-US"/>
+          </a:p>
+        </p:txBody>
+      </p:sp>
     </p:spTree>
   </p:cSld>
   <p:clrMapOvr>

</xml_diff>